<commit_message>
Update presentation file with new data and insights
</commit_message>
<xml_diff>
--- a/out_simple/Przewidywanie_opadow_PSI_prezentacja_V4.pptx
+++ b/out_simple/Przewidywanie_opadow_PSI_prezentacja_V4.pptx
@@ -9,19 +9,18 @@
     <p:sldId id="257" r:id="rId3"/>
     <p:sldId id="258" r:id="rId4"/>
     <p:sldId id="270" r:id="rId5"/>
-    <p:sldId id="259" r:id="rId6"/>
-    <p:sldId id="271" r:id="rId7"/>
-    <p:sldId id="266" r:id="rId8"/>
-    <p:sldId id="272" r:id="rId9"/>
-    <p:sldId id="273" r:id="rId10"/>
-    <p:sldId id="285" r:id="rId11"/>
-    <p:sldId id="286" r:id="rId12"/>
-    <p:sldId id="260" r:id="rId13"/>
-    <p:sldId id="279" r:id="rId14"/>
-    <p:sldId id="284" r:id="rId15"/>
-    <p:sldId id="282" r:id="rId16"/>
-    <p:sldId id="288" r:id="rId17"/>
-    <p:sldId id="283" r:id="rId18"/>
+    <p:sldId id="271" r:id="rId6"/>
+    <p:sldId id="266" r:id="rId7"/>
+    <p:sldId id="272" r:id="rId8"/>
+    <p:sldId id="273" r:id="rId9"/>
+    <p:sldId id="285" r:id="rId10"/>
+    <p:sldId id="286" r:id="rId11"/>
+    <p:sldId id="260" r:id="rId12"/>
+    <p:sldId id="279" r:id="rId13"/>
+    <p:sldId id="284" r:id="rId14"/>
+    <p:sldId id="282" r:id="rId15"/>
+    <p:sldId id="288" r:id="rId16"/>
+    <p:sldId id="283" r:id="rId17"/>
   </p:sldIdLst>
   <p:sldSz cx="9144000" cy="6858000" type="screen4x3"/>
   <p:notesSz cx="6858000" cy="9144000"/>
@@ -12018,8 +12017,18 @@
           <a:lstStyle/>
           <a:p>
             <a:r>
-              <a:t>Przewidywanie opadów (IMGW) – model per stacja</a:t>
-            </a:r>
+              <a:rPr dirty="0" err="1"/>
+              <a:t>Przewidywanie</a:t>
+            </a:r>
+            <a:r>
+              <a:rPr dirty="0"/>
+              <a:t> </a:t>
+            </a:r>
+            <a:r>
+              <a:rPr dirty="0" err="1"/>
+              <a:t>opadów</a:t>
+            </a:r>
+            <a:endParaRPr dirty="0"/>
           </a:p>
         </p:txBody>
       </p:sp>
@@ -12070,96 +12079,6 @@
 </file>
 
 <file path=ppt/slides/slide10.xml><?xml version="1.0" encoding="utf-8"?>
-<p:sld xmlns:a="http://schemas.openxmlformats.org/drawingml/2006/main" xmlns:r="http://schemas.openxmlformats.org/officeDocument/2006/relationships" xmlns:p="http://schemas.openxmlformats.org/presentationml/2006/main">
-  <p:cSld>
-    <p:spTree>
-      <p:nvGrpSpPr>
-        <p:cNvPr id="1" name=""/>
-        <p:cNvGrpSpPr/>
-        <p:nvPr/>
-      </p:nvGrpSpPr>
-      <p:grpSpPr>
-        <a:xfrm>
-          <a:off x="0" y="0"/>
-          <a:ext cx="0" cy="0"/>
-          <a:chOff x="0" y="0"/>
-          <a:chExt cx="0" cy="0"/>
-        </a:xfrm>
-      </p:grpSpPr>
-      <p:sp>
-        <p:nvSpPr>
-          <p:cNvPr id="2" name="Tytuł 1">
-            <a:extLst>
-              <a:ext uri="{FF2B5EF4-FFF2-40B4-BE49-F238E27FC236}">
-                <a16:creationId xmlns:a16="http://schemas.microsoft.com/office/drawing/2014/main" id="{E4E12B56-133A-CFD4-01CF-7F4CEBF6DB58}"/>
-              </a:ext>
-            </a:extLst>
-          </p:cNvPr>
-          <p:cNvSpPr>
-            <a:spLocks noGrp="1"/>
-          </p:cNvSpPr>
-          <p:nvPr>
-            <p:ph type="title"/>
-          </p:nvPr>
-        </p:nvSpPr>
-        <p:spPr/>
-        <p:txBody>
-          <a:bodyPr/>
-          <a:lstStyle/>
-          <a:p>
-            <a:r>
-              <a:rPr lang="pl-PL" dirty="0"/>
-              <a:t>Budowanie cech</a:t>
-            </a:r>
-          </a:p>
-        </p:txBody>
-      </p:sp>
-      <p:pic>
-        <p:nvPicPr>
-          <p:cNvPr id="5" name="Symbol zastępczy zawartości 4">
-            <a:extLst>
-              <a:ext uri="{FF2B5EF4-FFF2-40B4-BE49-F238E27FC236}">
-                <a16:creationId xmlns:a16="http://schemas.microsoft.com/office/drawing/2014/main" id="{A677F237-2D1E-D6D3-22A3-E1CF96FA30BD}"/>
-              </a:ext>
-            </a:extLst>
-          </p:cNvPr>
-          <p:cNvPicPr>
-            <a:picLocks noGrp="1" noChangeAspect="1"/>
-          </p:cNvPicPr>
-          <p:nvPr>
-            <p:ph idx="1"/>
-          </p:nvPr>
-        </p:nvPicPr>
-        <p:blipFill>
-          <a:blip r:embed="rId2"/>
-          <a:stretch>
-            <a:fillRect/>
-          </a:stretch>
-        </p:blipFill>
-        <p:spPr>
-          <a:xfrm>
-            <a:off x="1216000" y="1601251"/>
-            <a:ext cx="6712000" cy="4683435"/>
-          </a:xfrm>
-          <a:prstGeom prst="rect">
-            <a:avLst/>
-          </a:prstGeom>
-        </p:spPr>
-      </p:pic>
-    </p:spTree>
-    <p:extLst>
-      <p:ext uri="{BB962C8B-B14F-4D97-AF65-F5344CB8AC3E}">
-        <p14:creationId xmlns:p14="http://schemas.microsoft.com/office/powerpoint/2010/main" val="2933986660"/>
-      </p:ext>
-    </p:extLst>
-  </p:cSld>
-  <p:clrMapOvr>
-    <a:masterClrMapping/>
-  </p:clrMapOvr>
-</p:sld>
-</file>
-
-<file path=ppt/slides/slide11.xml><?xml version="1.0" encoding="utf-8"?>
 <p:sld xmlns:a="http://schemas.openxmlformats.org/drawingml/2006/main" xmlns:r="http://schemas.openxmlformats.org/officeDocument/2006/relationships" xmlns:p="http://schemas.openxmlformats.org/presentationml/2006/main">
   <p:cSld>
     <p:spTree>
@@ -12249,7 +12168,7 @@
 </p:sld>
 </file>
 
-<file path=ppt/slides/slide12.xml><?xml version="1.0" encoding="utf-8"?>
+<file path=ppt/slides/slide11.xml><?xml version="1.0" encoding="utf-8"?>
 <p:sld xmlns:a="http://schemas.openxmlformats.org/drawingml/2006/main" xmlns:r="http://schemas.openxmlformats.org/officeDocument/2006/relationships" xmlns:p="http://schemas.openxmlformats.org/presentationml/2006/main">
   <p:cSld>
     <p:bg>
@@ -13335,7 +13254,7 @@
 </p:sld>
 </file>
 
-<file path=ppt/slides/slide13.xml><?xml version="1.0" encoding="utf-8"?>
+<file path=ppt/slides/slide12.xml><?xml version="1.0" encoding="utf-8"?>
 <p:sld xmlns:a="http://schemas.openxmlformats.org/drawingml/2006/main" xmlns:r="http://schemas.openxmlformats.org/officeDocument/2006/relationships" xmlns:p="http://schemas.openxmlformats.org/presentationml/2006/main">
   <p:cSld>
     <p:spTree>
@@ -13521,7 +13440,7 @@
 </p:sld>
 </file>
 
-<file path=ppt/slides/slide14.xml><?xml version="1.0" encoding="utf-8"?>
+<file path=ppt/slides/slide13.xml><?xml version="1.0" encoding="utf-8"?>
 <p:sld xmlns:a="http://schemas.openxmlformats.org/drawingml/2006/main" xmlns:r="http://schemas.openxmlformats.org/officeDocument/2006/relationships" xmlns:p="http://schemas.openxmlformats.org/presentationml/2006/main">
   <p:cSld>
     <p:bg>
@@ -14567,23 +14486,23 @@
               </a:lnSpc>
             </a:pPr>
             <a:r>
-              <a:rPr lang="pl-PL" sz="1100"/>
+              <a:rPr lang="pl-PL" sz="1100" dirty="0"/>
               <a:t>LĘBORK (354170125) — </a:t>
             </a:r>
             <a:r>
-              <a:rPr lang="pl-PL" sz="1100" err="1"/>
+              <a:rPr lang="pl-PL" sz="1100" dirty="0" err="1"/>
               <a:t>acc</a:t>
             </a:r>
             <a:r>
-              <a:rPr lang="pl-PL" sz="1100"/>
+              <a:rPr lang="pl-PL" sz="1100" dirty="0"/>
               <a:t>=0.72, </a:t>
             </a:r>
             <a:r>
-              <a:rPr lang="pl-PL" sz="1100" err="1"/>
+              <a:rPr lang="pl-PL" sz="1100" dirty="0" err="1"/>
               <a:t>pos_rate</a:t>
             </a:r>
             <a:r>
-              <a:rPr lang="pl-PL" sz="1100"/>
+              <a:rPr lang="pl-PL" sz="1100" dirty="0"/>
               <a:t>=0.29, n=362</a:t>
             </a:r>
           </a:p>
@@ -14594,23 +14513,23 @@
               </a:lnSpc>
             </a:pPr>
             <a:r>
-              <a:rPr lang="pl-PL" sz="1100"/>
+              <a:rPr lang="pl-PL" sz="1100" dirty="0"/>
               <a:t>LESKO (349220690) — </a:t>
             </a:r>
             <a:r>
-              <a:rPr lang="pl-PL" sz="1100" err="1"/>
+              <a:rPr lang="pl-PL" sz="1100" dirty="0" err="1"/>
               <a:t>acc</a:t>
             </a:r>
             <a:r>
-              <a:rPr lang="pl-PL" sz="1100"/>
+              <a:rPr lang="pl-PL" sz="1100" dirty="0"/>
               <a:t>=0.70, </a:t>
             </a:r>
             <a:r>
-              <a:rPr lang="pl-PL" sz="1100" err="1"/>
+              <a:rPr lang="pl-PL" sz="1100" dirty="0" err="1"/>
               <a:t>pos_rate</a:t>
             </a:r>
             <a:r>
-              <a:rPr lang="pl-PL" sz="1100"/>
+              <a:rPr lang="pl-PL" sz="1100" dirty="0"/>
               <a:t>=0.37, n=363</a:t>
             </a:r>
           </a:p>
@@ -14621,23 +14540,23 @@
               </a:lnSpc>
             </a:pPr>
             <a:r>
-              <a:rPr lang="pl-PL" sz="1100"/>
+              <a:rPr lang="pl-PL" sz="1100" dirty="0"/>
               <a:t>LESZNO (351160418) — </a:t>
             </a:r>
             <a:r>
-              <a:rPr lang="pl-PL" sz="1100" err="1"/>
+              <a:rPr lang="pl-PL" sz="1100" dirty="0" err="1"/>
               <a:t>acc</a:t>
             </a:r>
             <a:r>
-              <a:rPr lang="pl-PL" sz="1100"/>
+              <a:rPr lang="pl-PL" sz="1100" dirty="0"/>
               <a:t>=0.69, </a:t>
             </a:r>
             <a:r>
-              <a:rPr lang="pl-PL" sz="1100" err="1"/>
+              <a:rPr lang="pl-PL" sz="1100" dirty="0" err="1"/>
               <a:t>pos_rate</a:t>
             </a:r>
             <a:r>
-              <a:rPr lang="pl-PL" sz="1100"/>
+              <a:rPr lang="pl-PL" sz="1100" dirty="0"/>
               <a:t>=0.38, n=363</a:t>
             </a:r>
           </a:p>
@@ -14648,23 +14567,23 @@
               </a:lnSpc>
             </a:pPr>
             <a:r>
-              <a:rPr lang="pl-PL" sz="1100"/>
+              <a:rPr lang="pl-PL" sz="1100" dirty="0"/>
               <a:t>RESKO-SMÓLSKO (353150210) — </a:t>
             </a:r>
             <a:r>
-              <a:rPr lang="pl-PL" sz="1100" err="1"/>
+              <a:rPr lang="pl-PL" sz="1100" dirty="0" err="1"/>
               <a:t>acc</a:t>
             </a:r>
             <a:r>
-              <a:rPr lang="pl-PL" sz="1100"/>
+              <a:rPr lang="pl-PL" sz="1100" dirty="0"/>
               <a:t>=0.69, </a:t>
             </a:r>
             <a:r>
-              <a:rPr lang="pl-PL" sz="1100" err="1"/>
+              <a:rPr lang="pl-PL" sz="1100" dirty="0" err="1"/>
               <a:t>pos_rate</a:t>
             </a:r>
             <a:r>
-              <a:rPr lang="pl-PL" sz="1100"/>
+              <a:rPr lang="pl-PL" sz="1100" dirty="0"/>
               <a:t>=0.36, n=360</a:t>
             </a:r>
           </a:p>
@@ -14675,23 +14594,23 @@
               </a:lnSpc>
             </a:pPr>
             <a:r>
-              <a:rPr lang="pl-PL" sz="1100"/>
+              <a:rPr lang="pl-PL" sz="1100" dirty="0"/>
               <a:t>ELBLĄG-MILEJEWO (354190160) — </a:t>
             </a:r>
             <a:r>
-              <a:rPr lang="pl-PL" sz="1100" err="1"/>
+              <a:rPr lang="pl-PL" sz="1100" dirty="0" err="1"/>
               <a:t>acc</a:t>
             </a:r>
             <a:r>
-              <a:rPr lang="pl-PL" sz="1100"/>
+              <a:rPr lang="pl-PL" sz="1100" dirty="0"/>
               <a:t>=0.69, </a:t>
             </a:r>
             <a:r>
-              <a:rPr lang="pl-PL" sz="1100" err="1"/>
+              <a:rPr lang="pl-PL" sz="1100" dirty="0" err="1"/>
               <a:t>pos_rate</a:t>
             </a:r>
             <a:r>
-              <a:rPr lang="pl-PL" sz="1100"/>
+              <a:rPr lang="pl-PL" sz="1100" dirty="0"/>
               <a:t>=0.37, n=363</a:t>
             </a:r>
           </a:p>
@@ -14702,23 +14621,23 @@
               </a:lnSpc>
             </a:pPr>
             <a:r>
-              <a:rPr lang="pl-PL" sz="1100"/>
+              <a:rPr lang="pl-PL" sz="1100" dirty="0"/>
               <a:t>TARNÓW (350200575) — </a:t>
             </a:r>
             <a:r>
-              <a:rPr lang="pl-PL" sz="1100" err="1"/>
+              <a:rPr lang="pl-PL" sz="1100" dirty="0" err="1"/>
               <a:t>acc</a:t>
             </a:r>
             <a:r>
-              <a:rPr lang="pl-PL" sz="1100"/>
+              <a:rPr lang="pl-PL" sz="1100" dirty="0"/>
               <a:t>=0.69, </a:t>
             </a:r>
             <a:r>
-              <a:rPr lang="pl-PL" sz="1100" err="1"/>
+              <a:rPr lang="pl-PL" sz="1100" dirty="0" err="1"/>
               <a:t>pos_rate</a:t>
             </a:r>
             <a:r>
-              <a:rPr lang="pl-PL" sz="1100"/>
+              <a:rPr lang="pl-PL" sz="1100" dirty="0"/>
               <a:t>=0.36, n=356</a:t>
             </a:r>
           </a:p>
@@ -14729,23 +14648,23 @@
               </a:lnSpc>
             </a:pPr>
             <a:r>
-              <a:rPr lang="pl-PL" sz="1100"/>
+              <a:rPr lang="pl-PL" sz="1100" dirty="0"/>
               <a:t>KATOWICE-MUCHOWIEC (350190560) — </a:t>
             </a:r>
             <a:r>
-              <a:rPr lang="pl-PL" sz="1100" err="1"/>
+              <a:rPr lang="pl-PL" sz="1100" dirty="0" err="1"/>
               <a:t>acc</a:t>
             </a:r>
             <a:r>
-              <a:rPr lang="pl-PL" sz="1100"/>
+              <a:rPr lang="pl-PL" sz="1100" dirty="0"/>
               <a:t>=0.68, </a:t>
             </a:r>
             <a:r>
-              <a:rPr lang="pl-PL" sz="1100" err="1"/>
+              <a:rPr lang="pl-PL" sz="1100" dirty="0" err="1"/>
               <a:t>pos_rate</a:t>
             </a:r>
             <a:r>
-              <a:rPr lang="pl-PL" sz="1100"/>
+              <a:rPr lang="pl-PL" sz="1100" dirty="0"/>
               <a:t>=0.41, n=365</a:t>
             </a:r>
           </a:p>
@@ -14756,23 +14675,23 @@
               </a:lnSpc>
             </a:pPr>
             <a:r>
-              <a:rPr lang="pl-PL" sz="1100"/>
+              <a:rPr lang="pl-PL" sz="1100" dirty="0"/>
               <a:t>HALA GĄSIENICOWA (349200628) — </a:t>
             </a:r>
             <a:r>
-              <a:rPr lang="pl-PL" sz="1100" err="1"/>
+              <a:rPr lang="pl-PL" sz="1100" dirty="0" err="1"/>
               <a:t>acc</a:t>
             </a:r>
             <a:r>
-              <a:rPr lang="pl-PL" sz="1100"/>
+              <a:rPr lang="pl-PL" sz="1100" dirty="0"/>
               <a:t>=0.68, </a:t>
             </a:r>
             <a:r>
-              <a:rPr lang="pl-PL" sz="1100" err="1"/>
+              <a:rPr lang="pl-PL" sz="1100" dirty="0" err="1"/>
               <a:t>pos_rate</a:t>
             </a:r>
             <a:r>
-              <a:rPr lang="pl-PL" sz="1100"/>
+              <a:rPr lang="pl-PL" sz="1100" dirty="0"/>
               <a:t>=0.40, n=361</a:t>
             </a:r>
           </a:p>
@@ -14783,23 +14702,23 @@
               </a:lnSpc>
             </a:pPr>
             <a:r>
-              <a:rPr lang="pl-PL" sz="1100"/>
+              <a:rPr lang="pl-PL" sz="1100" dirty="0"/>
               <a:t>SŁUBICE (352140310) — </a:t>
             </a:r>
             <a:r>
-              <a:rPr lang="pl-PL" sz="1100" err="1"/>
+              <a:rPr lang="pl-PL" sz="1100" dirty="0" err="1"/>
               <a:t>acc</a:t>
             </a:r>
             <a:r>
-              <a:rPr lang="pl-PL" sz="1100"/>
+              <a:rPr lang="pl-PL" sz="1100" dirty="0"/>
               <a:t>=0.68, </a:t>
             </a:r>
             <a:r>
-              <a:rPr lang="pl-PL" sz="1100" err="1"/>
+              <a:rPr lang="pl-PL" sz="1100" dirty="0" err="1"/>
               <a:t>pos_rate</a:t>
             </a:r>
             <a:r>
-              <a:rPr lang="pl-PL" sz="1100"/>
+              <a:rPr lang="pl-PL" sz="1100" dirty="0"/>
               <a:t>=0.42, n=365</a:t>
             </a:r>
           </a:p>
@@ -14810,23 +14729,23 @@
               </a:lnSpc>
             </a:pPr>
             <a:r>
-              <a:rPr lang="pl-PL" sz="1100"/>
+              <a:rPr lang="pl-PL" sz="1100" dirty="0"/>
               <a:t>LEGNICA (351160415) — </a:t>
             </a:r>
             <a:r>
-              <a:rPr lang="pl-PL" sz="1100" err="1"/>
+              <a:rPr lang="pl-PL" sz="1100" dirty="0" err="1"/>
               <a:t>acc</a:t>
             </a:r>
             <a:r>
-              <a:rPr lang="pl-PL" sz="1100"/>
+              <a:rPr lang="pl-PL" sz="1100" dirty="0"/>
               <a:t>=0.68, </a:t>
             </a:r>
             <a:r>
-              <a:rPr lang="pl-PL" sz="1100" err="1"/>
+              <a:rPr lang="pl-PL" sz="1100" dirty="0" err="1"/>
               <a:t>pos_rate</a:t>
             </a:r>
             <a:r>
-              <a:rPr lang="pl-PL" sz="1100"/>
+              <a:rPr lang="pl-PL" sz="1100" dirty="0"/>
               <a:t>=0.42, n=361</a:t>
             </a:r>
           </a:p>
@@ -14840,7 +14759,7 @@
 </p:sld>
 </file>
 
-<file path=ppt/slides/slide15.xml><?xml version="1.0" encoding="utf-8"?>
+<file path=ppt/slides/slide14.xml><?xml version="1.0" encoding="utf-8"?>
 <p:sld xmlns:a="http://schemas.openxmlformats.org/drawingml/2006/main" xmlns:r="http://schemas.openxmlformats.org/officeDocument/2006/relationships" xmlns:p="http://schemas.openxmlformats.org/presentationml/2006/main">
   <p:cSld>
     <p:spTree>
@@ -14923,7 +14842,7 @@
 </p:sld>
 </file>
 
-<file path=ppt/slides/slide16.xml><?xml version="1.0" encoding="utf-8"?>
+<file path=ppt/slides/slide15.xml><?xml version="1.0" encoding="utf-8"?>
 <p:sld xmlns:a="http://schemas.openxmlformats.org/drawingml/2006/main" xmlns:r="http://schemas.openxmlformats.org/officeDocument/2006/relationships" xmlns:p="http://schemas.openxmlformats.org/presentationml/2006/main">
   <p:cSld>
     <p:spTree>
@@ -15061,7 +14980,7 @@
 </p:sld>
 </file>
 
-<file path=ppt/slides/slide17.xml><?xml version="1.0" encoding="utf-8"?>
+<file path=ppt/slides/slide16.xml><?xml version="1.0" encoding="utf-8"?>
 <p:sld xmlns:a="http://schemas.openxmlformats.org/drawingml/2006/main" xmlns:r="http://schemas.openxmlformats.org/officeDocument/2006/relationships" xmlns:p="http://schemas.openxmlformats.org/presentationml/2006/main">
   <p:cSld>
     <p:spTree>
@@ -17062,340 +16981,6 @@
       </p:grpSpPr>
       <p:sp>
         <p:nvSpPr>
-          <p:cNvPr id="2" name="Title 1"/>
-          <p:cNvSpPr>
-            <a:spLocks noGrp="1"/>
-          </p:cNvSpPr>
-          <p:nvPr>
-            <p:ph type="title"/>
-          </p:nvPr>
-        </p:nvSpPr>
-        <p:spPr/>
-        <p:txBody>
-          <a:bodyPr/>
-          <a:lstStyle/>
-          <a:p>
-            <a:r>
-              <a:t>Przygotowanie danych</a:t>
-            </a:r>
-          </a:p>
-        </p:txBody>
-      </p:sp>
-      <p:sp>
-        <p:nvSpPr>
-          <p:cNvPr id="3" name="Content Placeholder 2"/>
-          <p:cNvSpPr>
-            <a:spLocks noGrp="1"/>
-          </p:cNvSpPr>
-          <p:nvPr>
-            <p:ph idx="1"/>
-          </p:nvPr>
-        </p:nvSpPr>
-        <p:spPr/>
-        <p:txBody>
-          <a:bodyPr/>
-          <a:lstStyle/>
-          <a:p>
-            <a:r>
-              <a:rPr dirty="0"/>
-              <a:t>Model per </a:t>
-            </a:r>
-            <a:r>
-              <a:rPr dirty="0" err="1"/>
-              <a:t>stacja</a:t>
-            </a:r>
-            <a:r>
-              <a:rPr dirty="0"/>
-              <a:t> (bez </a:t>
-            </a:r>
-            <a:r>
-              <a:rPr dirty="0" err="1"/>
-              <a:t>mapowania</a:t>
-            </a:r>
-            <a:r>
-              <a:rPr dirty="0"/>
-              <a:t>) </a:t>
-            </a:r>
-            <a:r>
-              <a:rPr dirty="0" err="1"/>
-              <a:t>stacji</a:t>
-            </a:r>
-            <a:r>
-              <a:rPr dirty="0"/>
-              <a:t> </a:t>
-            </a:r>
-            <a:r>
-              <a:rPr dirty="0" err="1"/>
-              <a:t>na</a:t>
-            </a:r>
-            <a:r>
-              <a:rPr dirty="0"/>
-              <a:t> </a:t>
-            </a:r>
-            <a:r>
-              <a:rPr dirty="0" err="1"/>
-              <a:t>stacjia</a:t>
-            </a:r>
-            <a:r>
-              <a:rPr dirty="0"/>
-              <a:t> (</a:t>
-            </a:r>
-            <a:r>
-              <a:rPr dirty="0" err="1"/>
-              <a:t>każde</a:t>
-            </a:r>
-            <a:r>
-              <a:rPr dirty="0"/>
-              <a:t> </a:t>
-            </a:r>
-            <a:r>
-              <a:rPr dirty="0" err="1"/>
-              <a:t>stacjio</a:t>
-            </a:r>
-            <a:r>
-              <a:rPr dirty="0"/>
-              <a:t> </a:t>
-            </a:r>
-            <a:r>
-              <a:rPr dirty="0" err="1"/>
-              <a:t>otrzymuje</a:t>
-            </a:r>
-            <a:r>
-              <a:rPr dirty="0"/>
-              <a:t> </a:t>
-            </a:r>
-            <a:r>
-              <a:rPr dirty="0" err="1"/>
-              <a:t>zbliżoną</a:t>
-            </a:r>
-            <a:r>
-              <a:rPr dirty="0"/>
-              <a:t> </a:t>
-            </a:r>
-            <a:r>
-              <a:rPr dirty="0" err="1"/>
-              <a:t>liczbę</a:t>
-            </a:r>
-            <a:r>
-              <a:rPr dirty="0"/>
-              <a:t> </a:t>
-            </a:r>
-            <a:r>
-              <a:rPr dirty="0" err="1"/>
-              <a:t>stacji</a:t>
-            </a:r>
-            <a:r>
-              <a:rPr dirty="0"/>
-              <a:t>).</a:t>
-            </a:r>
-          </a:p>
-          <a:p>
-            <a:r>
-              <a:rPr dirty="0" err="1"/>
-              <a:t>Agregacja</a:t>
-            </a:r>
-            <a:r>
-              <a:rPr dirty="0"/>
-              <a:t> </a:t>
-            </a:r>
-            <a:r>
-              <a:rPr dirty="0" err="1"/>
-              <a:t>danych</a:t>
-            </a:r>
-            <a:r>
-              <a:rPr dirty="0"/>
-              <a:t> </a:t>
-            </a:r>
-            <a:r>
-              <a:rPr dirty="0" err="1"/>
-              <a:t>stacyjnych</a:t>
-            </a:r>
-            <a:r>
-              <a:rPr dirty="0"/>
-              <a:t> do </a:t>
-            </a:r>
-            <a:r>
-              <a:rPr dirty="0" err="1"/>
-              <a:t>poziomu</a:t>
-            </a:r>
-            <a:r>
-              <a:rPr dirty="0"/>
-              <a:t> </a:t>
-            </a:r>
-            <a:r>
-              <a:rPr dirty="0" err="1"/>
-              <a:t>stacja</a:t>
-            </a:r>
-            <a:r>
-              <a:rPr dirty="0"/>
-              <a:t> </a:t>
-            </a:r>
-            <a:r>
-              <a:rPr dirty="0" err="1"/>
-              <a:t>i</a:t>
-            </a:r>
-            <a:r>
-              <a:rPr dirty="0"/>
-              <a:t> </a:t>
-            </a:r>
-            <a:r>
-              <a:rPr dirty="0" err="1"/>
-              <a:t>dnia</a:t>
-            </a:r>
-            <a:r>
-              <a:rPr dirty="0"/>
-              <a:t>.</a:t>
-            </a:r>
-          </a:p>
-          <a:p>
-            <a:r>
-              <a:rPr dirty="0" err="1"/>
-              <a:t>Utworzenie</a:t>
-            </a:r>
-            <a:r>
-              <a:rPr dirty="0"/>
-              <a:t> </a:t>
-            </a:r>
-            <a:r>
-              <a:rPr dirty="0" err="1"/>
-              <a:t>cech</a:t>
-            </a:r>
-            <a:r>
-              <a:rPr dirty="0"/>
-              <a:t> </a:t>
-            </a:r>
-            <a:r>
-              <a:rPr dirty="0" err="1"/>
-              <a:t>opisujących</a:t>
-            </a:r>
-            <a:r>
-              <a:rPr dirty="0"/>
-              <a:t> </a:t>
-            </a:r>
-            <a:r>
-              <a:rPr dirty="0" err="1"/>
-              <a:t>warunki</a:t>
-            </a:r>
-            <a:r>
-              <a:rPr dirty="0"/>
-              <a:t> </a:t>
-            </a:r>
-            <a:r>
-              <a:rPr dirty="0" err="1"/>
-              <a:t>pogodowe</a:t>
-            </a:r>
-            <a:r>
-              <a:rPr dirty="0"/>
-              <a:t> (np. </a:t>
-            </a:r>
-            <a:r>
-              <a:rPr dirty="0" err="1"/>
-              <a:t>temperatura</a:t>
-            </a:r>
-            <a:r>
-              <a:rPr dirty="0"/>
-              <a:t>, </a:t>
-            </a:r>
-            <a:r>
-              <a:rPr dirty="0" err="1"/>
-              <a:t>wilgotność</a:t>
-            </a:r>
-            <a:r>
-              <a:rPr dirty="0"/>
-              <a:t>, </a:t>
-            </a:r>
-            <a:r>
-              <a:rPr dirty="0" err="1"/>
-              <a:t>wiatr</a:t>
-            </a:r>
-            <a:r>
-              <a:rPr dirty="0"/>
-              <a:t>, </a:t>
-            </a:r>
-            <a:r>
-              <a:rPr dirty="0" err="1"/>
-              <a:t>opad</a:t>
-            </a:r>
-            <a:r>
-              <a:rPr dirty="0"/>
-              <a:t>).</a:t>
-            </a:r>
-          </a:p>
-          <a:p>
-            <a:r>
-              <a:rPr dirty="0" err="1"/>
-              <a:t>Przygotowano</a:t>
-            </a:r>
-            <a:r>
-              <a:rPr dirty="0"/>
-              <a:t> </a:t>
-            </a:r>
-            <a:r>
-              <a:rPr lang="pl-PL" dirty="0"/>
-              <a:t>106 886 </a:t>
-            </a:r>
-            <a:r>
-              <a:rPr dirty="0" err="1"/>
-              <a:t>rekordów</a:t>
-            </a:r>
-            <a:r>
-              <a:rPr dirty="0"/>
-              <a:t> (</a:t>
-            </a:r>
-            <a:r>
-              <a:rPr dirty="0" err="1"/>
-              <a:t>obserwacji</a:t>
-            </a:r>
-            <a:r>
-              <a:rPr dirty="0"/>
-              <a:t>) do </a:t>
-            </a:r>
-            <a:r>
-              <a:rPr dirty="0" err="1"/>
-              <a:t>uczenia</a:t>
-            </a:r>
-            <a:r>
-              <a:rPr dirty="0"/>
-              <a:t> </a:t>
-            </a:r>
-            <a:r>
-              <a:rPr dirty="0" err="1"/>
-              <a:t>modelu</a:t>
-            </a:r>
-            <a:r>
-              <a:rPr dirty="0"/>
-              <a:t>.</a:t>
-            </a:r>
-          </a:p>
-        </p:txBody>
-      </p:sp>
-    </p:spTree>
-  </p:cSld>
-  <p:clrMapOvr>
-    <a:masterClrMapping/>
-  </p:clrMapOvr>
-</p:sld>
-</file>
-
-<file path=ppt/slides/slide6.xml><?xml version="1.0" encoding="utf-8"?>
-<p:sld xmlns:a="http://schemas.openxmlformats.org/drawingml/2006/main" xmlns:r="http://schemas.openxmlformats.org/officeDocument/2006/relationships" xmlns:p="http://schemas.openxmlformats.org/presentationml/2006/main">
-  <p:cSld>
-    <p:spTree>
-      <p:nvGrpSpPr>
-        <p:cNvPr id="1" name=""/>
-        <p:cNvGrpSpPr/>
-        <p:nvPr/>
-      </p:nvGrpSpPr>
-      <p:grpSpPr>
-        <a:xfrm>
-          <a:off x="0" y="0"/>
-          <a:ext cx="0" cy="0"/>
-          <a:chOff x="0" y="0"/>
-          <a:chExt cx="0" cy="0"/>
-        </a:xfrm>
-      </p:grpSpPr>
-      <p:sp>
-        <p:nvSpPr>
           <p:cNvPr id="2" name="Tytuł 1">
             <a:extLst>
               <a:ext uri="{FF2B5EF4-FFF2-40B4-BE49-F238E27FC236}">
@@ -17595,7 +17180,7 @@
 </p:sld>
 </file>
 
-<file path=ppt/slides/slide7.xml><?xml version="1.0" encoding="utf-8"?>
+<file path=ppt/slides/slide6.xml><?xml version="1.0" encoding="utf-8"?>
 <p:sld xmlns:a="http://schemas.openxmlformats.org/drawingml/2006/main" xmlns:r="http://schemas.openxmlformats.org/officeDocument/2006/relationships" xmlns:p="http://schemas.openxmlformats.org/presentationml/2006/main">
   <p:cSld>
     <p:bg>
@@ -17949,7 +17534,7 @@
 </p:sld>
 </file>
 
-<file path=ppt/slides/slide8.xml><?xml version="1.0" encoding="utf-8"?>
+<file path=ppt/slides/slide7.xml><?xml version="1.0" encoding="utf-8"?>
 <p:sld xmlns:a="http://schemas.openxmlformats.org/drawingml/2006/main" xmlns:r="http://schemas.openxmlformats.org/officeDocument/2006/relationships" xmlns:p="http://schemas.openxmlformats.org/presentationml/2006/main">
   <p:cSld>
     <p:spTree>
@@ -18037,7 +17622,7 @@
 </p:sld>
 </file>
 
-<file path=ppt/slides/slide9.xml><?xml version="1.0" encoding="utf-8"?>
+<file path=ppt/slides/slide8.xml><?xml version="1.0" encoding="utf-8"?>
 <p:sld xmlns:a="http://schemas.openxmlformats.org/drawingml/2006/main" xmlns:r="http://schemas.openxmlformats.org/officeDocument/2006/relationships" xmlns:p="http://schemas.openxmlformats.org/presentationml/2006/main">
   <p:cSld>
     <p:spTree>
@@ -18119,6 +17704,96 @@
     <p:extLst>
       <p:ext uri="{BB962C8B-B14F-4D97-AF65-F5344CB8AC3E}">
         <p14:creationId xmlns:p14="http://schemas.microsoft.com/office/powerpoint/2010/main" val="1520911548"/>
+      </p:ext>
+    </p:extLst>
+  </p:cSld>
+  <p:clrMapOvr>
+    <a:masterClrMapping/>
+  </p:clrMapOvr>
+</p:sld>
+</file>
+
+<file path=ppt/slides/slide9.xml><?xml version="1.0" encoding="utf-8"?>
+<p:sld xmlns:a="http://schemas.openxmlformats.org/drawingml/2006/main" xmlns:r="http://schemas.openxmlformats.org/officeDocument/2006/relationships" xmlns:p="http://schemas.openxmlformats.org/presentationml/2006/main">
+  <p:cSld>
+    <p:spTree>
+      <p:nvGrpSpPr>
+        <p:cNvPr id="1" name=""/>
+        <p:cNvGrpSpPr/>
+        <p:nvPr/>
+      </p:nvGrpSpPr>
+      <p:grpSpPr>
+        <a:xfrm>
+          <a:off x="0" y="0"/>
+          <a:ext cx="0" cy="0"/>
+          <a:chOff x="0" y="0"/>
+          <a:chExt cx="0" cy="0"/>
+        </a:xfrm>
+      </p:grpSpPr>
+      <p:sp>
+        <p:nvSpPr>
+          <p:cNvPr id="2" name="Tytuł 1">
+            <a:extLst>
+              <a:ext uri="{FF2B5EF4-FFF2-40B4-BE49-F238E27FC236}">
+                <a16:creationId xmlns:a16="http://schemas.microsoft.com/office/drawing/2014/main" id="{E4E12B56-133A-CFD4-01CF-7F4CEBF6DB58}"/>
+              </a:ext>
+            </a:extLst>
+          </p:cNvPr>
+          <p:cNvSpPr>
+            <a:spLocks noGrp="1"/>
+          </p:cNvSpPr>
+          <p:nvPr>
+            <p:ph type="title"/>
+          </p:nvPr>
+        </p:nvSpPr>
+        <p:spPr/>
+        <p:txBody>
+          <a:bodyPr/>
+          <a:lstStyle/>
+          <a:p>
+            <a:r>
+              <a:rPr lang="pl-PL" dirty="0"/>
+              <a:t>Budowanie cech</a:t>
+            </a:r>
+          </a:p>
+        </p:txBody>
+      </p:sp>
+      <p:pic>
+        <p:nvPicPr>
+          <p:cNvPr id="5" name="Symbol zastępczy zawartości 4">
+            <a:extLst>
+              <a:ext uri="{FF2B5EF4-FFF2-40B4-BE49-F238E27FC236}">
+                <a16:creationId xmlns:a16="http://schemas.microsoft.com/office/drawing/2014/main" id="{A677F237-2D1E-D6D3-22A3-E1CF96FA30BD}"/>
+              </a:ext>
+            </a:extLst>
+          </p:cNvPr>
+          <p:cNvPicPr>
+            <a:picLocks noGrp="1" noChangeAspect="1"/>
+          </p:cNvPicPr>
+          <p:nvPr>
+            <p:ph idx="1"/>
+          </p:nvPr>
+        </p:nvPicPr>
+        <p:blipFill>
+          <a:blip r:embed="rId2"/>
+          <a:stretch>
+            <a:fillRect/>
+          </a:stretch>
+        </p:blipFill>
+        <p:spPr>
+          <a:xfrm>
+            <a:off x="1216000" y="1601251"/>
+            <a:ext cx="6712000" cy="4683435"/>
+          </a:xfrm>
+          <a:prstGeom prst="rect">
+            <a:avLst/>
+          </a:prstGeom>
+        </p:spPr>
+      </p:pic>
+    </p:spTree>
+    <p:extLst>
+      <p:ext uri="{BB962C8B-B14F-4D97-AF65-F5344CB8AC3E}">
+        <p14:creationId xmlns:p14="http://schemas.microsoft.com/office/powerpoint/2010/main" val="2933986660"/>
       </p:ext>
     </p:extLst>
   </p:cSld>

</xml_diff>

<commit_message>
Update presentation file with revised content and visuals
</commit_message>
<xml_diff>
--- a/out_simple/Przewidywanie_opadow_PSI_prezentacja_V4.pptx
+++ b/out_simple/Przewidywanie_opadow_PSI_prezentacja_V4.pptx
@@ -19,8 +19,8 @@
     <p:sldId id="279" r:id="rId13"/>
     <p:sldId id="284" r:id="rId14"/>
     <p:sldId id="282" r:id="rId15"/>
-    <p:sldId id="288" r:id="rId16"/>
-    <p:sldId id="283" r:id="rId17"/>
+    <p:sldId id="283" r:id="rId16"/>
+    <p:sldId id="288" r:id="rId17"/>
   </p:sldIdLst>
   <p:sldSz cx="9144000" cy="6858000" type="screen4x3"/>
   <p:notesSz cx="6858000" cy="9144000"/>
@@ -136,6 +136,27 @@
     </p:ext>
   </p:extLst>
 </p:presentation>
+</file>
+
+<file path=ppt/changesInfos/changesInfo1.xml><?xml version="1.0" encoding="utf-8"?>
+<pc:chgInfo xmlns:a="http://schemas.openxmlformats.org/drawingml/2006/main" xmlns:r="http://schemas.openxmlformats.org/officeDocument/2006/relationships" xmlns:ac="http://schemas.microsoft.com/office/drawing/2013/main/command" xmlns:pc="http://schemas.microsoft.com/office/powerpoint/2013/main/command">
+  <pc:docChgLst>
+    <pc:chgData name="Sebastian Bułdak" userId="e7fa126e1e7a54b7" providerId="LiveId" clId="{425CCAF0-AFC5-4608-AD67-6A6A5EB25EA0}"/>
+    <pc:docChg chg="modSld sldOrd">
+      <pc:chgData name="Sebastian Bułdak" userId="e7fa126e1e7a54b7" providerId="LiveId" clId="{425CCAF0-AFC5-4608-AD67-6A6A5EB25EA0}" dt="2025-11-14T22:00:14.322" v="1"/>
+      <pc:docMkLst>
+        <pc:docMk/>
+      </pc:docMkLst>
+      <pc:sldChg chg="ord">
+        <pc:chgData name="Sebastian Bułdak" userId="e7fa126e1e7a54b7" providerId="LiveId" clId="{425CCAF0-AFC5-4608-AD67-6A6A5EB25EA0}" dt="2025-11-14T22:00:14.322" v="1"/>
+        <pc:sldMkLst>
+          <pc:docMk/>
+          <pc:sldMk cId="0" sldId="283"/>
+        </pc:sldMkLst>
+      </pc:sldChg>
+    </pc:docChg>
+  </pc:docChgLst>
+</pc:chgInfo>
 </file>
 
 <file path=ppt/diagrams/colors1.xml><?xml version="1.0" encoding="utf-8"?>
@@ -14861,13 +14882,7 @@
       </p:grpSpPr>
       <p:sp>
         <p:nvSpPr>
-          <p:cNvPr id="2" name="Tytuł 1">
-            <a:extLst>
-              <a:ext uri="{FF2B5EF4-FFF2-40B4-BE49-F238E27FC236}">
-                <a16:creationId xmlns:a16="http://schemas.microsoft.com/office/drawing/2014/main" id="{AAC821D9-B767-23CC-4F85-0B3B93D42BB1}"/>
-              </a:ext>
-            </a:extLst>
-          </p:cNvPr>
+          <p:cNvPr id="2" name="Title 1"/>
           <p:cNvSpPr>
             <a:spLocks noGrp="1"/>
           </p:cNvSpPr>
@@ -14882,20 +14897,14 @@
           <a:p>
             <a:r>
               <a:rPr lang="pl-PL" dirty="0"/>
-              <a:t>Testy</a:t>
+              <a:t>Wyniki testów</a:t>
             </a:r>
           </a:p>
         </p:txBody>
       </p:sp>
       <p:sp>
         <p:nvSpPr>
-          <p:cNvPr id="3" name="Symbol zastępczy zawartości 2">
-            <a:extLst>
-              <a:ext uri="{FF2B5EF4-FFF2-40B4-BE49-F238E27FC236}">
-                <a16:creationId xmlns:a16="http://schemas.microsoft.com/office/drawing/2014/main" id="{FF29D712-7E95-A077-694A-A5015198438F}"/>
-              </a:ext>
-            </a:extLst>
-          </p:cNvPr>
+          <p:cNvPr id="3" name="Content Placeholder 2"/>
           <p:cNvSpPr>
             <a:spLocks noGrp="1"/>
           </p:cNvSpPr>
@@ -14905,74 +14914,65 @@
         </p:nvSpPr>
         <p:spPr/>
         <p:txBody>
-          <a:bodyPr>
-            <a:normAutofit/>
-          </a:bodyPr>
+          <a:bodyPr/>
           <a:lstStyle/>
           <a:p>
             <a:r>
-              <a:rPr lang="pl-PL" dirty="0" err="1"/>
-              <a:t>Accuracy</a:t>
-            </a:r>
-            <a:r>
-              <a:rPr lang="pl-PL" dirty="0"/>
-              <a:t> – odsetek wszystkich trafień:</a:t>
-            </a:r>
-          </a:p>
-          <a:p>
-            <a:r>
-              <a:rPr lang="pl-PL" dirty="0"/>
-              <a:t>Precision (precyzja) dla „Opad” - 61% alarmów deszczu to prawdziwe deszcze</a:t>
-            </a:r>
-          </a:p>
-          <a:p>
-            <a:r>
-              <a:rPr lang="pl-PL" dirty="0" err="1"/>
-              <a:t>Recall</a:t>
-            </a:r>
-            <a:r>
-              <a:rPr lang="pl-PL" dirty="0"/>
-              <a:t> (czułość) dla „Opad” – z ilu faktycznych deszczy model zrobił alarm: 44% </a:t>
-            </a:r>
-          </a:p>
-          <a:p>
-            <a:r>
-              <a:rPr lang="pl-PL" dirty="0"/>
-              <a:t>F1 (dla „Opad”) – średnia harmoniczna precision i </a:t>
-            </a:r>
-            <a:r>
-              <a:rPr lang="pl-PL" dirty="0" err="1"/>
-              <a:t>recall</a:t>
-            </a:r>
-            <a:r>
-              <a:rPr lang="pl-PL" dirty="0"/>
-              <a:t>; 0.51 (umiarkowanie).</a:t>
-            </a:r>
-          </a:p>
-          <a:p>
-            <a:r>
-              <a:rPr lang="pl-PL" dirty="0"/>
-              <a:t>ROC AUC – jak dobrze model porządkuje przypadki (niezależnie od progu).</a:t>
-            </a:r>
-            <a:br>
-              <a:rPr lang="pl-PL" dirty="0"/>
-            </a:br>
-            <a:r>
-              <a:rPr lang="pl-PL" dirty="0"/>
-              <a:t>0.5 = losowo, 1.0 = idealnie.  0.671 → rozdzielczość jest średnia+:</a:t>
-            </a:r>
-          </a:p>
-          <a:p>
-            <a:endParaRPr lang="pl-PL" dirty="0"/>
+              <a:rPr dirty="0"/>
+              <a:t>Accuracy: 0.655</a:t>
+            </a:r>
+          </a:p>
+          <a:p>
+            <a:r>
+              <a:rPr dirty="0"/>
+              <a:t>ROC AUC: 0.671</a:t>
+            </a:r>
+          </a:p>
+          <a:p>
+            <a:r>
+              <a:rPr dirty="0"/>
+              <a:t>PR AUC: 0.571</a:t>
+            </a:r>
+          </a:p>
+          <a:p>
+            <a:r>
+              <a:rPr dirty="0" err="1"/>
+              <a:t>Klasa</a:t>
+            </a:r>
+            <a:r>
+              <a:rPr dirty="0"/>
+              <a:t> '</a:t>
+            </a:r>
+            <a:r>
+              <a:rPr dirty="0" err="1"/>
+              <a:t>Opad</a:t>
+            </a:r>
+            <a:r>
+              <a:rPr dirty="0"/>
+              <a:t>' — P=0.61, R=0.44, F1=0.51</a:t>
+            </a:r>
+          </a:p>
+          <a:p>
+            <a:r>
+              <a:rPr dirty="0" err="1"/>
+              <a:t>Klasa</a:t>
+            </a:r>
+            <a:r>
+              <a:rPr dirty="0"/>
+              <a:t> 'Brak </a:t>
+            </a:r>
+            <a:r>
+              <a:rPr dirty="0" err="1"/>
+              <a:t>opadu</a:t>
+            </a:r>
+            <a:r>
+              <a:rPr dirty="0"/>
+              <a:t>' — P=0.67, R=0.80, F1=0.73</a:t>
+            </a:r>
           </a:p>
         </p:txBody>
       </p:sp>
     </p:spTree>
-    <p:extLst>
-      <p:ext uri="{BB962C8B-B14F-4D97-AF65-F5344CB8AC3E}">
-        <p14:creationId xmlns:p14="http://schemas.microsoft.com/office/powerpoint/2010/main" val="995330825"/>
-      </p:ext>
-    </p:extLst>
   </p:cSld>
   <p:clrMapOvr>
     <a:masterClrMapping/>
@@ -14999,7 +14999,13 @@
       </p:grpSpPr>
       <p:sp>
         <p:nvSpPr>
-          <p:cNvPr id="2" name="Title 1"/>
+          <p:cNvPr id="2" name="Tytuł 1">
+            <a:extLst>
+              <a:ext uri="{FF2B5EF4-FFF2-40B4-BE49-F238E27FC236}">
+                <a16:creationId xmlns:a16="http://schemas.microsoft.com/office/drawing/2014/main" id="{AAC821D9-B767-23CC-4F85-0B3B93D42BB1}"/>
+              </a:ext>
+            </a:extLst>
+          </p:cNvPr>
           <p:cNvSpPr>
             <a:spLocks noGrp="1"/>
           </p:cNvSpPr>
@@ -15014,14 +15020,20 @@
           <a:p>
             <a:r>
               <a:rPr lang="pl-PL" dirty="0"/>
-              <a:t>Wyniki testów</a:t>
+              <a:t>Testy</a:t>
             </a:r>
           </a:p>
         </p:txBody>
       </p:sp>
       <p:sp>
         <p:nvSpPr>
-          <p:cNvPr id="3" name="Content Placeholder 2"/>
+          <p:cNvPr id="3" name="Symbol zastępczy zawartości 2">
+            <a:extLst>
+              <a:ext uri="{FF2B5EF4-FFF2-40B4-BE49-F238E27FC236}">
+                <a16:creationId xmlns:a16="http://schemas.microsoft.com/office/drawing/2014/main" id="{FF29D712-7E95-A077-694A-A5015198438F}"/>
+              </a:ext>
+            </a:extLst>
+          </p:cNvPr>
           <p:cNvSpPr>
             <a:spLocks noGrp="1"/>
           </p:cNvSpPr>
@@ -15031,65 +15043,74 @@
         </p:nvSpPr>
         <p:spPr/>
         <p:txBody>
-          <a:bodyPr/>
+          <a:bodyPr>
+            <a:normAutofit/>
+          </a:bodyPr>
           <a:lstStyle/>
           <a:p>
             <a:r>
-              <a:rPr dirty="0"/>
-              <a:t>Accuracy: 0.655</a:t>
-            </a:r>
-          </a:p>
-          <a:p>
-            <a:r>
-              <a:rPr dirty="0"/>
-              <a:t>ROC AUC: 0.671</a:t>
-            </a:r>
-          </a:p>
-          <a:p>
-            <a:r>
-              <a:rPr dirty="0"/>
-              <a:t>PR AUC: 0.571</a:t>
-            </a:r>
-          </a:p>
-          <a:p>
-            <a:r>
-              <a:rPr dirty="0" err="1"/>
-              <a:t>Klasa</a:t>
-            </a:r>
-            <a:r>
-              <a:rPr dirty="0"/>
-              <a:t> '</a:t>
-            </a:r>
-            <a:r>
-              <a:rPr dirty="0" err="1"/>
-              <a:t>Opad</a:t>
-            </a:r>
-            <a:r>
-              <a:rPr dirty="0"/>
-              <a:t>' — P=0.61, R=0.44, F1=0.51</a:t>
-            </a:r>
-          </a:p>
-          <a:p>
-            <a:r>
-              <a:rPr dirty="0" err="1"/>
-              <a:t>Klasa</a:t>
-            </a:r>
-            <a:r>
-              <a:rPr dirty="0"/>
-              <a:t> 'Brak </a:t>
-            </a:r>
-            <a:r>
-              <a:rPr dirty="0" err="1"/>
-              <a:t>opadu</a:t>
-            </a:r>
-            <a:r>
-              <a:rPr dirty="0"/>
-              <a:t>' — P=0.67, R=0.80, F1=0.73</a:t>
-            </a:r>
+              <a:rPr lang="pl-PL" dirty="0" err="1"/>
+              <a:t>Accuracy</a:t>
+            </a:r>
+            <a:r>
+              <a:rPr lang="pl-PL" dirty="0"/>
+              <a:t> – odsetek wszystkich trafień:</a:t>
+            </a:r>
+          </a:p>
+          <a:p>
+            <a:r>
+              <a:rPr lang="pl-PL" dirty="0"/>
+              <a:t>Precision (precyzja) dla „Opad” - 61% alarmów deszczu to prawdziwe deszcze</a:t>
+            </a:r>
+          </a:p>
+          <a:p>
+            <a:r>
+              <a:rPr lang="pl-PL" dirty="0" err="1"/>
+              <a:t>Recall</a:t>
+            </a:r>
+            <a:r>
+              <a:rPr lang="pl-PL" dirty="0"/>
+              <a:t> (czułość) dla „Opad” – z ilu faktycznych deszczy model zrobił alarm: 44% </a:t>
+            </a:r>
+          </a:p>
+          <a:p>
+            <a:r>
+              <a:rPr lang="pl-PL" dirty="0"/>
+              <a:t>F1 (dla „Opad”) – średnia harmoniczna precision i </a:t>
+            </a:r>
+            <a:r>
+              <a:rPr lang="pl-PL" dirty="0" err="1"/>
+              <a:t>recall</a:t>
+            </a:r>
+            <a:r>
+              <a:rPr lang="pl-PL" dirty="0"/>
+              <a:t>; 0.51 (umiarkowanie).</a:t>
+            </a:r>
+          </a:p>
+          <a:p>
+            <a:r>
+              <a:rPr lang="pl-PL" dirty="0"/>
+              <a:t>ROC AUC – jak dobrze model porządkuje przypadki (niezależnie od progu).</a:t>
+            </a:r>
+            <a:br>
+              <a:rPr lang="pl-PL" dirty="0"/>
+            </a:br>
+            <a:r>
+              <a:rPr lang="pl-PL" dirty="0"/>
+              <a:t>0.5 = losowo, 1.0 = idealnie.  0.671 → rozdzielczość jest średnia+:</a:t>
+            </a:r>
+          </a:p>
+          <a:p>
+            <a:endParaRPr lang="pl-PL" dirty="0"/>
           </a:p>
         </p:txBody>
       </p:sp>
     </p:spTree>
+    <p:extLst>
+      <p:ext uri="{BB962C8B-B14F-4D97-AF65-F5344CB8AC3E}">
+        <p14:creationId xmlns:p14="http://schemas.microsoft.com/office/powerpoint/2010/main" val="995330825"/>
+      </p:ext>
+    </p:extLst>
   </p:cSld>
   <p:clrMapOvr>
     <a:masterClrMapping/>

</xml_diff>